<commit_message>
Update Lecture 1 -- Linear models.pptx
</commit_message>
<xml_diff>
--- a/Week 1/Lecture/Lecture 1 -- Linear models.pptx
+++ b/Week 1/Lecture/Lecture 1 -- Linear models.pptx
@@ -236,7 +236,7 @@
           <a:p>
             <a:fld id="{1522831B-4FE3-4D45-950B-0D2C6BB2DD76}" type="datetimeFigureOut">
               <a:rPr lang="en-US" smtClean="0"/>
-              <a:t>3/25/2024</a:t>
+              <a:t>3/26/2024</a:t>
             </a:fld>
             <a:endParaRPr lang="en-US"/>
           </a:p>
@@ -3876,7 +3876,7 @@
           <a:p>
             <a:r>
               <a:rPr lang="en-US"/>
-              <a:t>March 27, 2018</a:t>
+              <a:t>March 27, 2024</a:t>
             </a:r>
             <a:endParaRPr lang="en-US" dirty="0"/>
           </a:p>
@@ -9598,7 +9598,7 @@
           <a:graphicData uri="http://schemas.openxmlformats.org/presentationml/2006/ole">
             <mc:AlternateContent xmlns:mc="http://schemas.openxmlformats.org/markup-compatibility/2006">
               <mc:Choice xmlns:v="urn:schemas-microsoft-com:vml" Requires="v">
-                <p:oleObj spid="_x0000_s3150" name="Equation" r:id="rId4" imgW="914400" imgH="291960" progId="Equation.DSMT4">
+                <p:oleObj spid="_x0000_s3151" name="Equation" r:id="rId4" imgW="914400" imgH="291960" progId="Equation.DSMT4">
                   <p:embed/>
                 </p:oleObj>
               </mc:Choice>

</xml_diff>